<commit_message>
LLD and HLD Added
</commit_message>
<xml_diff>
--- a/Internship DPR.pptx
+++ b/Internship DPR.pptx
@@ -7404,38 +7404,6 @@
       </p:grpSpPr>
       <p:sp>
         <p:nvSpPr>
-          <p:cNvPr id="2" name="Title 1">
-            <a:extLst>
-              <a:ext uri="{FF2B5EF4-FFF2-40B4-BE49-F238E27FC236}">
-                <a16:creationId xmlns:a16="http://schemas.microsoft.com/office/drawing/2014/main" id="{2D12F177-5E6B-F35C-7F9E-E1D81115A3B7}"/>
-              </a:ext>
-            </a:extLst>
-          </p:cNvPr>
-          <p:cNvSpPr>
-            <a:spLocks noGrp="1"/>
-          </p:cNvSpPr>
-          <p:nvPr>
-            <p:ph type="ctrTitle"/>
-          </p:nvPr>
-        </p:nvSpPr>
-        <p:spPr>
-          <a:xfrm rot="370413" flipH="1">
-            <a:off x="-5211195" y="3940191"/>
-            <a:ext cx="4145083" cy="166059"/>
-          </a:xfrm>
-        </p:spPr>
-        <p:txBody>
-          <a:bodyPr>
-            <a:normAutofit fontScale="90000"/>
-          </a:bodyPr>
-          <a:lstStyle/>
-          <a:p>
-            <a:endParaRPr lang="en-IN" dirty="0"/>
-          </a:p>
-        </p:txBody>
-      </p:sp>
-      <p:sp>
-        <p:nvSpPr>
           <p:cNvPr id="3" name="Subtitle 2">
             <a:extLst>
               <a:ext uri="{FF2B5EF4-FFF2-40B4-BE49-F238E27FC236}">
@@ -7572,38 +7540,6 @@
           </a:p>
         </p:txBody>
       </p:sp>
-      <p:sp>
-        <p:nvSpPr>
-          <p:cNvPr id="3" name="Content Placeholder 2">
-            <a:extLst>
-              <a:ext uri="{FF2B5EF4-FFF2-40B4-BE49-F238E27FC236}">
-                <a16:creationId xmlns:a16="http://schemas.microsoft.com/office/drawing/2014/main" id="{68231645-D869-D42B-6F8F-7DD7D6E77202}"/>
-              </a:ext>
-            </a:extLst>
-          </p:cNvPr>
-          <p:cNvSpPr>
-            <a:spLocks noGrp="1"/>
-          </p:cNvSpPr>
-          <p:nvPr>
-            <p:ph idx="1"/>
-          </p:nvPr>
-        </p:nvSpPr>
-        <p:spPr>
-          <a:xfrm rot="264061">
-            <a:off x="11142421" y="40195"/>
-            <a:ext cx="1049372" cy="45719"/>
-          </a:xfrm>
-        </p:spPr>
-        <p:txBody>
-          <a:bodyPr>
-            <a:normAutofit fontScale="25000" lnSpcReduction="20000"/>
-          </a:bodyPr>
-          <a:lstStyle/>
-          <a:p>
-            <a:endParaRPr lang="en-IN" dirty="0"/>
-          </a:p>
-        </p:txBody>
-      </p:sp>
     </p:spTree>
     <p:extLst>
       <p:ext uri="{BB962C8B-B14F-4D97-AF65-F5344CB8AC3E}">
@@ -7736,38 +7672,6 @@
               <a:rPr lang="en-IN" sz="2400" dirty="0"/>
               <a:t>		7. Expenses 				Decimal</a:t>
             </a:r>
-          </a:p>
-        </p:txBody>
-      </p:sp>
-      <p:sp>
-        <p:nvSpPr>
-          <p:cNvPr id="3" name="Content Placeholder 2">
-            <a:extLst>
-              <a:ext uri="{FF2B5EF4-FFF2-40B4-BE49-F238E27FC236}">
-                <a16:creationId xmlns:a16="http://schemas.microsoft.com/office/drawing/2014/main" id="{B2DD5FB7-F957-CA84-336C-BF4E172ADF3B}"/>
-              </a:ext>
-            </a:extLst>
-          </p:cNvPr>
-          <p:cNvSpPr>
-            <a:spLocks noGrp="1"/>
-          </p:cNvSpPr>
-          <p:nvPr>
-            <p:ph idx="1"/>
-          </p:nvPr>
-        </p:nvSpPr>
-        <p:spPr>
-          <a:xfrm flipH="1" flipV="1">
-            <a:off x="-817658" y="6291471"/>
-            <a:ext cx="45719" cy="205546"/>
-          </a:xfrm>
-        </p:spPr>
-        <p:txBody>
-          <a:bodyPr>
-            <a:normAutofit fontScale="32500" lnSpcReduction="20000"/>
-          </a:bodyPr>
-          <a:lstStyle/>
-          <a:p>
-            <a:endParaRPr lang="en-IN" dirty="0"/>
           </a:p>
         </p:txBody>
       </p:sp>
@@ -8009,36 +7913,6 @@
           </a:p>
         </p:txBody>
       </p:sp>
-      <p:sp>
-        <p:nvSpPr>
-          <p:cNvPr id="3" name="Content Placeholder 2">
-            <a:extLst>
-              <a:ext uri="{FF2B5EF4-FFF2-40B4-BE49-F238E27FC236}">
-                <a16:creationId xmlns:a16="http://schemas.microsoft.com/office/drawing/2014/main" id="{D1678128-55F2-8CFB-B8C8-0F24082F8427}"/>
-              </a:ext>
-            </a:extLst>
-          </p:cNvPr>
-          <p:cNvSpPr>
-            <a:spLocks noGrp="1"/>
-          </p:cNvSpPr>
-          <p:nvPr>
-            <p:ph idx="1"/>
-          </p:nvPr>
-        </p:nvSpPr>
-        <p:spPr>
-          <a:xfrm>
-            <a:off x="221974" y="10800521"/>
-            <a:ext cx="559904" cy="1161015"/>
-          </a:xfrm>
-        </p:spPr>
-        <p:txBody>
-          <a:bodyPr/>
-          <a:lstStyle/>
-          <a:p>
-            <a:endParaRPr lang="en-IN" dirty="0"/>
-          </a:p>
-        </p:txBody>
-      </p:sp>
     </p:spTree>
     <p:extLst>
       <p:ext uri="{BB962C8B-B14F-4D97-AF65-F5344CB8AC3E}">
@@ -8140,38 +8014,6 @@
               <a:t>	- Regression model created during training is loaded and clusters for the 	 	  preprocessed data is predicted</a:t>
             </a:r>
             <a:endParaRPr lang="en-IN" sz="2400" dirty="0"/>
-          </a:p>
-        </p:txBody>
-      </p:sp>
-      <p:sp>
-        <p:nvSpPr>
-          <p:cNvPr id="3" name="Content Placeholder 2">
-            <a:extLst>
-              <a:ext uri="{FF2B5EF4-FFF2-40B4-BE49-F238E27FC236}">
-                <a16:creationId xmlns:a16="http://schemas.microsoft.com/office/drawing/2014/main" id="{F8CACF89-C764-94FF-BD8C-E7F58FA2D448}"/>
-              </a:ext>
-            </a:extLst>
-          </p:cNvPr>
-          <p:cNvSpPr>
-            <a:spLocks noGrp="1"/>
-          </p:cNvSpPr>
-          <p:nvPr>
-            <p:ph idx="1"/>
-          </p:nvPr>
-        </p:nvSpPr>
-        <p:spPr>
-          <a:xfrm>
-            <a:off x="-811696" y="9163878"/>
-            <a:ext cx="970722" cy="277812"/>
-          </a:xfrm>
-        </p:spPr>
-        <p:txBody>
-          <a:bodyPr>
-            <a:normAutofit fontScale="55000" lnSpcReduction="20000"/>
-          </a:bodyPr>
-          <a:lstStyle/>
-          <a:p>
-            <a:endParaRPr lang="en-IN" dirty="0"/>
           </a:p>
         </p:txBody>
       </p:sp>
@@ -8321,36 +8163,6 @@
           </a:p>
         </p:txBody>
       </p:sp>
-      <p:sp>
-        <p:nvSpPr>
-          <p:cNvPr id="3" name="Content Placeholder 2">
-            <a:extLst>
-              <a:ext uri="{FF2B5EF4-FFF2-40B4-BE49-F238E27FC236}">
-                <a16:creationId xmlns:a16="http://schemas.microsoft.com/office/drawing/2014/main" id="{6F695DC7-E0B8-4AB8-FA3B-F8C09949DE0F}"/>
-              </a:ext>
-            </a:extLst>
-          </p:cNvPr>
-          <p:cNvSpPr>
-            <a:spLocks noGrp="1"/>
-          </p:cNvSpPr>
-          <p:nvPr>
-            <p:ph idx="1"/>
-          </p:nvPr>
-        </p:nvSpPr>
-        <p:spPr>
-          <a:xfrm>
-            <a:off x="-1109869" y="8110329"/>
-            <a:ext cx="672548" cy="531537"/>
-          </a:xfrm>
-        </p:spPr>
-        <p:txBody>
-          <a:bodyPr/>
-          <a:lstStyle/>
-          <a:p>
-            <a:endParaRPr lang="en-IN" dirty="0"/>
-          </a:p>
-        </p:txBody>
-      </p:sp>
     </p:spTree>
     <p:extLst>
       <p:ext uri="{BB962C8B-B14F-4D97-AF65-F5344CB8AC3E}">
@@ -8484,38 +8296,6 @@
               <a:t> - Scaling the data</a:t>
             </a:r>
             <a:endParaRPr lang="en-IN" sz="2400" dirty="0"/>
-          </a:p>
-        </p:txBody>
-      </p:sp>
-      <p:sp>
-        <p:nvSpPr>
-          <p:cNvPr id="3" name="Content Placeholder 2">
-            <a:extLst>
-              <a:ext uri="{FF2B5EF4-FFF2-40B4-BE49-F238E27FC236}">
-                <a16:creationId xmlns:a16="http://schemas.microsoft.com/office/drawing/2014/main" id="{826CA018-9E82-ACC3-E913-F6E36865D893}"/>
-              </a:ext>
-            </a:extLst>
-          </p:cNvPr>
-          <p:cNvSpPr>
-            <a:spLocks noGrp="1"/>
-          </p:cNvSpPr>
-          <p:nvPr>
-            <p:ph idx="1"/>
-          </p:nvPr>
-        </p:nvSpPr>
-        <p:spPr>
-          <a:xfrm>
-            <a:off x="-871330" y="8249478"/>
-            <a:ext cx="10515600" cy="308113"/>
-          </a:xfrm>
-        </p:spPr>
-        <p:txBody>
-          <a:bodyPr>
-            <a:normAutofit fontScale="62500" lnSpcReduction="20000"/>
-          </a:bodyPr>
-          <a:lstStyle/>
-          <a:p>
-            <a:endParaRPr lang="en-IN" dirty="0"/>
           </a:p>
         </p:txBody>
       </p:sp>

</xml_diff>